<commit_message>
add FP_remainder_arithmetic, edit mid3 probs
</commit_message>
<xml_diff>
--- a/spring17/slidesS17/gray-edges.pptx
+++ b/spring17/slidesS17/gray-edges.pptx
@@ -15040,7 +15040,7 @@
           <a:graphicData uri="http://schemas.openxmlformats.org/presentationml/2006/ole">
             <mc:AlternateContent xmlns:mc="http://schemas.openxmlformats.org/markup-compatibility/2006">
               <mc:Choice xmlns:v="urn:schemas-microsoft-com:vml" Requires="v">
-                <p:oleObj spid="_x0000_s41988" name="Equation" r:id="rId3" imgW="393700" imgH="228600" progId="Equation.DSMT4">
+                <p:oleObj spid="_x0000_s41991" name="Equation" r:id="rId3" imgW="393700" imgH="228600" progId="Equation.DSMT4">
                   <p:embed/>
                 </p:oleObj>
               </mc:Choice>
@@ -17692,7 +17692,7 @@
           <a:graphicData uri="http://schemas.openxmlformats.org/presentationml/2006/ole">
             <mc:AlternateContent xmlns:mc="http://schemas.openxmlformats.org/markup-compatibility/2006">
               <mc:Choice xmlns:v="urn:schemas-microsoft-com:vml" Requires="v">
-                <p:oleObj spid="_x0000_s43012" name="Equation" r:id="rId3" imgW="635000" imgH="228600" progId="Equation.DSMT4">
+                <p:oleObj spid="_x0000_s43015" name="Equation" r:id="rId3" imgW="635000" imgH="228600" progId="Equation.DSMT4">
                   <p:embed/>
                 </p:oleObj>
               </mc:Choice>
@@ -18110,7 +18110,7 @@
             <a:graphicData uri="http://schemas.openxmlformats.org/presentationml/2006/ole">
               <mc:AlternateContent xmlns:mc="http://schemas.openxmlformats.org/markup-compatibility/2006">
                 <mc:Choice xmlns:v="urn:schemas-microsoft-com:vml" Requires="v">
-                  <p:oleObj spid="_x0000_s44036" name="Equation" r:id="rId3" imgW="635000" imgH="228600" progId="Equation.DSMT4">
+                  <p:oleObj spid="_x0000_s44039" name="Equation" r:id="rId3" imgW="635000" imgH="228600" progId="Equation.DSMT4">
                     <p:embed/>
                   </p:oleObj>
                 </mc:Choice>
@@ -20338,7 +20338,7 @@
           <a:graphicData uri="http://schemas.openxmlformats.org/presentationml/2006/ole">
             <mc:AlternateContent xmlns:mc="http://schemas.openxmlformats.org/markup-compatibility/2006">
               <mc:Choice xmlns:v="urn:schemas-microsoft-com:vml" Requires="v">
-                <p:oleObj spid="_x0000_s46084" name="Equation" r:id="rId3" imgW="635000" imgH="228600" progId="Equation.DSMT4">
+                <p:oleObj spid="_x0000_s46087" name="Equation" r:id="rId3" imgW="635000" imgH="228600" progId="Equation.DSMT4">
                   <p:embed/>
                 </p:oleObj>
               </mc:Choice>
@@ -24526,7 +24526,7 @@
       </p:sp>
       <p:sp>
         <p:nvSpPr>
-          <p:cNvPr id="6" name="Title 1"/>
+          <p:cNvPr id="7" name="Title 1"/>
           <p:cNvSpPr>
             <a:spLocks noGrp="1"/>
           </p:cNvSpPr>
@@ -24546,23 +24546,11 @@
           <a:p>
             <a:r>
               <a:rPr lang="en-US" dirty="0" smtClean="0"/>
-              <a:t>Connected Graph </a:t>
-            </a:r>
-            <a:r>
-              <a:rPr lang="en-US" dirty="0" smtClean="0">
-                <a:solidFill>
-                  <a:schemeClr val="accent1">
-                    <a:lumMod val="50000"/>
-                  </a:schemeClr>
-                </a:solidFill>
-              </a:rPr>
-              <a:t>G</a:t>
+              <a:t>Black-white coloring</a:t>
             </a:r>
             <a:endParaRPr lang="en-US" dirty="0">
               <a:solidFill>
-                <a:schemeClr val="accent1">
-                  <a:lumMod val="50000"/>
-                </a:schemeClr>
+                <a:srgbClr val="0000E5"/>
               </a:solidFill>
             </a:endParaRPr>
           </a:p>
@@ -24899,103 +24887,15 @@
   <p:clrMapOvr>
     <a:masterClrMapping/>
   </p:clrMapOvr>
-  <mc:AlternateContent xmlns:mc="http://schemas.openxmlformats.org/markup-compatibility/2006" xmlns:p14="http://schemas.microsoft.com/office/powerpoint/2010/main">
-    <mc:Choice Requires="p14">
-      <p:transition spd="med" p14:dur="700" advClick="0">
-        <p:fade/>
-      </p:transition>
-    </mc:Choice>
-    <mc:Fallback xmlns="">
-      <p:transition xmlns:p14="http://schemas.microsoft.com/office/powerpoint/2010/main" spd="med" advClick="0">
-        <p:fade/>
-      </p:transition>
-    </mc:Fallback>
-  </mc:AlternateContent>
+  <p:transition xmlns:p14="http://schemas.microsoft.com/office/powerpoint/2010/main" advClick="0">
+    <p:fade/>
+  </p:transition>
   <p:timing>
     <p:tnLst>
       <p:par>
-        <p:cTn xmlns:p14="http://schemas.microsoft.com/office/powerpoint/2010/main" id="1" dur="indefinite" restart="never" nodeType="tmRoot">
-          <p:childTnLst>
-            <p:seq concurrent="1" nextAc="seek">
-              <p:cTn id="2" dur="indefinite" nodeType="mainSeq">
-                <p:childTnLst>
-                  <p:par>
-                    <p:cTn id="3" fill="hold">
-                      <p:stCondLst>
-                        <p:cond delay="indefinite"/>
-                      </p:stCondLst>
-                      <p:childTnLst>
-                        <p:par>
-                          <p:cTn id="4" fill="hold">
-                            <p:stCondLst>
-                              <p:cond delay="0"/>
-                            </p:stCondLst>
-                            <p:childTnLst>
-                              <p:par>
-                                <p:cTn id="5" presetID="10" presetClass="entr" presetSubtype="0" fill="hold" grpId="0" nodeType="clickEffect">
-                                  <p:stCondLst>
-                                    <p:cond delay="0"/>
-                                  </p:stCondLst>
-                                  <p:childTnLst>
-                                    <p:set>
-                                      <p:cBhvr>
-                                        <p:cTn id="6" dur="1" fill="hold">
-                                          <p:stCondLst>
-                                            <p:cond delay="0"/>
-                                          </p:stCondLst>
-                                        </p:cTn>
-                                        <p:tgtEl>
-                                          <p:spTgt spid="5"/>
-                                        </p:tgtEl>
-                                        <p:attrNameLst>
-                                          <p:attrName>style.visibility</p:attrName>
-                                        </p:attrNameLst>
-                                      </p:cBhvr>
-                                      <p:to>
-                                        <p:strVal val="visible"/>
-                                      </p:to>
-                                    </p:set>
-                                    <p:animEffect transition="in" filter="fade">
-                                      <p:cBhvr>
-                                        <p:cTn id="7" dur="500"/>
-                                        <p:tgtEl>
-                                          <p:spTgt spid="5"/>
-                                        </p:tgtEl>
-                                      </p:cBhvr>
-                                    </p:animEffect>
-                                  </p:childTnLst>
-                                </p:cTn>
-                              </p:par>
-                            </p:childTnLst>
-                          </p:cTn>
-                        </p:par>
-                      </p:childTnLst>
-                    </p:cTn>
-                  </p:par>
-                </p:childTnLst>
-              </p:cTn>
-              <p:prevCondLst>
-                <p:cond evt="onPrev" delay="0">
-                  <p:tgtEl>
-                    <p:sldTgt/>
-                  </p:tgtEl>
-                </p:cond>
-              </p:prevCondLst>
-              <p:nextCondLst>
-                <p:cond evt="onNext" delay="0">
-                  <p:tgtEl>
-                    <p:sldTgt/>
-                  </p:tgtEl>
-                </p:cond>
-              </p:nextCondLst>
-            </p:seq>
-          </p:childTnLst>
-        </p:cTn>
+        <p:cTn xmlns:p14="http://schemas.microsoft.com/office/powerpoint/2010/main" id="1" dur="indefinite" restart="never" nodeType="tmRoot"/>
       </p:par>
     </p:tnLst>
-    <p:bldLst>
-      <p:bldP spid="5" grpId="0"/>
-    </p:bldLst>
   </p:timing>
 </p:sld>
 </file>
@@ -25927,7 +25827,7 @@
           <a:graphicData uri="http://schemas.openxmlformats.org/presentationml/2006/ole">
             <mc:AlternateContent xmlns:mc="http://schemas.openxmlformats.org/markup-compatibility/2006">
               <mc:Choice xmlns:v="urn:schemas-microsoft-com:vml" Requires="v">
-                <p:oleObj spid="_x0000_s32787" name="Equation" r:id="rId3" imgW="635000" imgH="228600" progId="Equation.DSMT4">
+                <p:oleObj spid="_x0000_s32790" name="Equation" r:id="rId3" imgW="635000" imgH="228600" progId="Equation.DSMT4">
                   <p:embed/>
                 </p:oleObj>
               </mc:Choice>
@@ -27109,7 +27009,7 @@
           <a:graphicData uri="http://schemas.openxmlformats.org/presentationml/2006/ole">
             <mc:AlternateContent xmlns:mc="http://schemas.openxmlformats.org/markup-compatibility/2006">
               <mc:Choice xmlns:v="urn:schemas-microsoft-com:vml" Requires="v">
-                <p:oleObj spid="_x0000_s48132" name="Equation" r:id="rId3" imgW="635000" imgH="228600" progId="Equation.DSMT4">
+                <p:oleObj spid="_x0000_s48135" name="Equation" r:id="rId3" imgW="635000" imgH="228600" progId="Equation.DSMT4">
                   <p:embed/>
                 </p:oleObj>
               </mc:Choice>
@@ -27826,7 +27726,7 @@
           <a:graphicData uri="http://schemas.openxmlformats.org/presentationml/2006/ole">
             <mc:AlternateContent xmlns:mc="http://schemas.openxmlformats.org/markup-compatibility/2006">
               <mc:Choice xmlns:v="urn:schemas-microsoft-com:vml" Requires="v">
-                <p:oleObj spid="_x0000_s40966" name="Equation" r:id="rId3" imgW="1117600" imgH="152400" progId="Equation.DSMT4">
+                <p:oleObj spid="_x0000_s40971" name="Equation" r:id="rId3" imgW="1117600" imgH="152400" progId="Equation.DSMT4">
                   <p:embed/>
                 </p:oleObj>
               </mc:Choice>
@@ -27883,7 +27783,7 @@
           <a:graphicData uri="http://schemas.openxmlformats.org/presentationml/2006/ole">
             <mc:AlternateContent xmlns:mc="http://schemas.openxmlformats.org/markup-compatibility/2006">
               <mc:Choice xmlns:v="urn:schemas-microsoft-com:vml" Requires="v">
-                <p:oleObj spid="_x0000_s40967" name="Equation" r:id="rId5" imgW="889000" imgH="228600" progId="Equation.DSMT4">
+                <p:oleObj spid="_x0000_s40972" name="Equation" r:id="rId5" imgW="889000" imgH="228600" progId="Equation.DSMT4">
                   <p:embed/>
                 </p:oleObj>
               </mc:Choice>

</xml_diff>